<commit_message>
Final MP2 ppt and module 7 labs
</commit_message>
<xml_diff>
--- a/IOD Projects/MP2New/New - Predicting Employee Attrition.pptx
+++ b/IOD Projects/MP2New/New - Predicting Employee Attrition.pptx
@@ -5,7 +5,7 @@
     <p:sldMasterId id="2147483712" r:id="rId4"/>
   </p:sldMasterIdLst>
   <p:notesMasterIdLst>
-    <p:notesMasterId r:id="rId24"/>
+    <p:notesMasterId r:id="rId25"/>
   </p:notesMasterIdLst>
   <p:sldIdLst>
     <p:sldId id="257" r:id="rId5"/>
@@ -24,9 +24,10 @@
     <p:sldId id="263" r:id="rId18"/>
     <p:sldId id="282" r:id="rId19"/>
     <p:sldId id="273" r:id="rId20"/>
-    <p:sldId id="278" r:id="rId21"/>
-    <p:sldId id="279" r:id="rId22"/>
-    <p:sldId id="283" r:id="rId23"/>
+    <p:sldId id="284" r:id="rId21"/>
+    <p:sldId id="278" r:id="rId22"/>
+    <p:sldId id="279" r:id="rId23"/>
+    <p:sldId id="283" r:id="rId24"/>
   </p:sldIdLst>
   <p:sldSz cx="12192000" cy="6858000"/>
   <p:notesSz cx="6858000" cy="9144000"/>
@@ -5519,7 +5520,7 @@
           <a:p>
             <a:fld id="{A07E5866-AB70-4D0F-8D8F-48D5D9B37390}" type="datetimeFigureOut">
               <a:rPr lang="en-AU" smtClean="0"/>
-              <a:t>15/02/2022</a:t>
+              <a:t>19/02/2022</a:t>
             </a:fld>
             <a:endParaRPr lang="en-AU"/>
           </a:p>
@@ -6025,7 +6026,7 @@
           <a:p>
             <a:fld id="{CE75B4B9-CF30-4BDA-8217-CCD5CE44D036}" type="datetime1">
               <a:rPr lang="en-US" smtClean="0"/>
-              <a:t>2/15/2022</a:t>
+              <a:t>2/19/2022</a:t>
             </a:fld>
             <a:endParaRPr lang="en-US" dirty="0"/>
           </a:p>
@@ -6228,7 +6229,7 @@
           <a:p>
             <a:fld id="{1C193699-C93A-42C6-9B55-5B2F3907F8A3}" type="datetime1">
               <a:rPr lang="en-US" smtClean="0"/>
-              <a:t>2/15/2022</a:t>
+              <a:t>2/19/2022</a:t>
             </a:fld>
             <a:endParaRPr lang="en-US" dirty="0"/>
           </a:p>
@@ -6590,7 +6591,7 @@
           <a:p>
             <a:fld id="{C5B684BE-6E37-4697-BC36-0788C59B5FD0}" type="datetime1">
               <a:rPr lang="en-US" smtClean="0"/>
-              <a:t>2/15/2022</a:t>
+              <a:t>2/19/2022</a:t>
             </a:fld>
             <a:endParaRPr lang="en-US" dirty="0"/>
           </a:p>
@@ -6788,7 +6789,7 @@
           <a:p>
             <a:fld id="{9E28EE13-0CCB-4692-9029-23DB8F8D53CB}" type="datetime1">
               <a:rPr lang="en-US" smtClean="0"/>
-              <a:t>2/15/2022</a:t>
+              <a:t>2/19/2022</a:t>
             </a:fld>
             <a:endParaRPr lang="en-US" dirty="0"/>
           </a:p>
@@ -7100,7 +7101,7 @@
           <a:p>
             <a:fld id="{2C4E6E62-3A7B-43CE-BEA5-406B63ECE4DC}" type="datetime1">
               <a:rPr lang="en-US" smtClean="0"/>
-              <a:t>2/15/2022</a:t>
+              <a:t>2/19/2022</a:t>
             </a:fld>
             <a:endParaRPr lang="en-US" dirty="0"/>
           </a:p>
@@ -7353,7 +7354,7 @@
           <a:p>
             <a:fld id="{C8EAF56F-191C-4D4E-ACDD-90151906ECC3}" type="datetime1">
               <a:rPr lang="en-US" smtClean="0"/>
-              <a:t>2/15/2022</a:t>
+              <a:t>2/19/2022</a:t>
             </a:fld>
             <a:endParaRPr lang="en-US" dirty="0"/>
           </a:p>
@@ -7775,7 +7776,7 @@
           <a:p>
             <a:fld id="{D08B9400-E1EE-4DDB-AFF7-EA68FD671226}" type="datetime1">
               <a:rPr lang="en-US" smtClean="0"/>
-              <a:t>2/15/2022</a:t>
+              <a:t>2/19/2022</a:t>
             </a:fld>
             <a:endParaRPr lang="en-US" dirty="0"/>
           </a:p>
@@ -7898,7 +7899,7 @@
           <a:p>
             <a:fld id="{AA529D0D-1005-459A-BFDD-5896740E6676}" type="datetime1">
               <a:rPr lang="en-US" smtClean="0"/>
-              <a:t>2/15/2022</a:t>
+              <a:t>2/19/2022</a:t>
             </a:fld>
             <a:endParaRPr lang="en-US" dirty="0"/>
           </a:p>
@@ -7993,7 +7994,7 @@
           <a:p>
             <a:fld id="{F72DB597-28BA-4ABE-9985-0E4EAC6408DA}" type="datetime1">
               <a:rPr lang="en-US" smtClean="0"/>
-              <a:t>2/15/2022</a:t>
+              <a:t>2/19/2022</a:t>
             </a:fld>
             <a:endParaRPr lang="en-US" dirty="0"/>
           </a:p>
@@ -8370,7 +8371,7 @@
           <a:p>
             <a:fld id="{616D13E0-C95C-476A-B128-0878CA4BAAF9}" type="datetime1">
               <a:rPr lang="en-US" smtClean="0"/>
-              <a:t>2/15/2022</a:t>
+              <a:t>2/19/2022</a:t>
             </a:fld>
             <a:endParaRPr lang="en-US" dirty="0"/>
           </a:p>
@@ -8663,7 +8664,7 @@
           <a:p>
             <a:fld id="{3B034887-F8FD-4CEC-A4E6-109E047CCFC0}" type="datetime1">
               <a:rPr lang="en-US" smtClean="0"/>
-              <a:t>2/15/2022</a:t>
+              <a:t>2/19/2022</a:t>
             </a:fld>
             <a:endParaRPr lang="en-US" dirty="0"/>
           </a:p>
@@ -8878,7 +8879,7 @@
           <a:p>
             <a:fld id="{941AEC8B-A736-421A-807A-756EA30AE0E0}" type="datetime1">
               <a:rPr lang="en-US" smtClean="0"/>
-              <a:t>2/15/2022</a:t>
+              <a:t>2/19/2022</a:t>
             </a:fld>
             <a:endParaRPr lang="en-US" dirty="0"/>
           </a:p>
@@ -11415,10 +11416,15 @@
             <p:ph idx="1"/>
           </p:nvPr>
         </p:nvSpPr>
-        <p:spPr/>
+        <p:spPr>
+          <a:xfrm>
+            <a:off x="581192" y="2006931"/>
+            <a:ext cx="11029615" cy="4416983"/>
+          </a:xfrm>
+        </p:spPr>
         <p:txBody>
           <a:bodyPr>
-            <a:normAutofit/>
+            <a:normAutofit lnSpcReduction="10000"/>
           </a:bodyPr>
           <a:lstStyle/>
           <a:p>
@@ -11452,10 +11458,7 @@
             <a:pPr marL="0" indent="0">
               <a:buNone/>
             </a:pPr>
-            <a:r>
-              <a:rPr lang="en-GB" dirty="0"/>
-              <a:t>2. Created 2 notebooks with selected features </a:t>
-            </a:r>
+            <a:endParaRPr lang="en-GB" dirty="0"/>
           </a:p>
           <a:p>
             <a:pPr marL="0" indent="0">
@@ -11463,7 +11466,7 @@
             </a:pPr>
             <a:r>
               <a:rPr lang="en-GB" dirty="0"/>
-              <a:t>   - Notebook 1 – with top 4 features</a:t>
+              <a:t>2. Created 2 notebooks with selected features </a:t>
             </a:r>
           </a:p>
           <a:p>
@@ -11472,7 +11475,7 @@
             </a:pPr>
             <a:r>
               <a:rPr lang="en-GB" dirty="0"/>
-              <a:t>   - Notebook 2 – with top 8 features</a:t>
+              <a:t>   - Notebook 1 – with top 4 features</a:t>
             </a:r>
           </a:p>
           <a:p>
@@ -11481,8 +11484,29 @@
             </a:pPr>
             <a:r>
               <a:rPr lang="en-GB" dirty="0"/>
+              <a:t>   - Notebook 2 – with top 8 features</a:t>
+            </a:r>
+          </a:p>
+          <a:p>
+            <a:pPr marL="0" indent="0">
+              <a:buNone/>
+            </a:pPr>
+            <a:endParaRPr lang="en-GB" dirty="0"/>
+          </a:p>
+          <a:p>
+            <a:pPr marL="0" indent="0">
+              <a:buNone/>
+            </a:pPr>
+            <a:r>
+              <a:rPr lang="en-GB" dirty="0"/>
               <a:t>3. Defined target value – check any class imbalance issues</a:t>
             </a:r>
+          </a:p>
+          <a:p>
+            <a:pPr marL="0" indent="0">
+              <a:buNone/>
+            </a:pPr>
+            <a:endParaRPr lang="en-GB" dirty="0"/>
           </a:p>
           <a:p>
             <a:pPr marL="0" indent="0">
@@ -11611,58 +11635,76 @@
         <p:spPr/>
         <p:txBody>
           <a:bodyPr>
-            <a:normAutofit/>
+            <a:normAutofit fontScale="92500" lnSpcReduction="10000"/>
           </a:bodyPr>
           <a:lstStyle/>
-          <a:p>
-            <a:pPr marL="0" indent="0">
-              <a:buNone/>
-            </a:pPr>
-            <a:r>
-              <a:rPr lang="en-GB" dirty="0"/>
-              <a:t>5. Scaled feature values for in both notebooks due to variance differences</a:t>
-            </a:r>
-          </a:p>
-          <a:p>
-            <a:pPr marL="0" indent="0">
-              <a:buNone/>
-            </a:pPr>
-            <a:r>
-              <a:rPr lang="en-GB" dirty="0"/>
-              <a:t>6. Used Logistic Regression, Decision Tree Classifier, Random Forest Classifier and K Nearest </a:t>
-            </a:r>
-            <a:r>
-              <a:rPr lang="en-GB" dirty="0" err="1"/>
-              <a:t>Neighbors</a:t>
-            </a:r>
-            <a:r>
-              <a:rPr lang="en-GB" dirty="0"/>
-              <a:t> machine learning models on data. Applied hyperparameter tuning only to Logistic Regression as the scores were significantly lower than the other models.</a:t>
-            </a:r>
-          </a:p>
-          <a:p>
-            <a:pPr marL="0" indent="0">
-              <a:buNone/>
-            </a:pPr>
-            <a:r>
-              <a:rPr lang="en-GB" dirty="0"/>
-              <a:t>7. Created precision – recall curves to be able to compare models among each others in both notebooks.</a:t>
-            </a:r>
-          </a:p>
-          <a:p>
-            <a:pPr marL="0" indent="0">
-              <a:buNone/>
-            </a:pPr>
-            <a:r>
-              <a:rPr lang="en-GB" dirty="0"/>
-              <a:t>8. Created confusion matrix </a:t>
-            </a:r>
-          </a:p>
           <a:p>
             <a:pPr marL="0" indent="0">
               <a:buNone/>
             </a:pPr>
             <a:endParaRPr lang="en-GB" dirty="0"/>
+          </a:p>
+          <a:p>
+            <a:pPr marL="0" indent="0">
+              <a:buNone/>
+            </a:pPr>
+            <a:r>
+              <a:rPr lang="en-GB" dirty="0"/>
+              <a:t>5. Scaled feature values for in both notebooks due to variance differences</a:t>
+            </a:r>
+          </a:p>
+          <a:p>
+            <a:pPr marL="0" indent="0">
+              <a:buNone/>
+            </a:pPr>
+            <a:endParaRPr lang="en-GB" dirty="0"/>
+          </a:p>
+          <a:p>
+            <a:pPr marL="0" indent="0">
+              <a:buNone/>
+            </a:pPr>
+            <a:r>
+              <a:rPr lang="en-GB" dirty="0"/>
+              <a:t>6. Used Logistic Regression, Decision Tree Classifier, Random Forest Classifier and K Nearest </a:t>
+            </a:r>
+            <a:r>
+              <a:rPr lang="en-GB" dirty="0" err="1"/>
+              <a:t>Neighbors</a:t>
+            </a:r>
+            <a:r>
+              <a:rPr lang="en-GB" dirty="0"/>
+              <a:t> machine learning models on data. Applied hyperparameter tuning only to Logistic Regression as the scores were significantly lower than the other models.</a:t>
+            </a:r>
+          </a:p>
+          <a:p>
+            <a:pPr marL="0" indent="0">
+              <a:buNone/>
+            </a:pPr>
+            <a:endParaRPr lang="en-GB" dirty="0"/>
+          </a:p>
+          <a:p>
+            <a:pPr marL="0" indent="0">
+              <a:buNone/>
+            </a:pPr>
+            <a:r>
+              <a:rPr lang="en-GB" dirty="0"/>
+              <a:t>7. Created precision – recall curves to be able to compare models among each others in both notebooks.</a:t>
+            </a:r>
+          </a:p>
+          <a:p>
+            <a:pPr marL="0" indent="0">
+              <a:buNone/>
+            </a:pPr>
+            <a:endParaRPr lang="en-GB" dirty="0"/>
+          </a:p>
+          <a:p>
+            <a:pPr marL="0" indent="0">
+              <a:buNone/>
+            </a:pPr>
+            <a:r>
+              <a:rPr lang="en-GB" dirty="0"/>
+              <a:t>8. Created confusion matrix </a:t>
+            </a:r>
           </a:p>
           <a:p>
             <a:pPr marL="0" indent="0">
@@ -12066,42 +12108,650 @@
         </p:nvSpPr>
         <p:spPr>
           <a:xfrm>
+            <a:off x="7356764" y="2112135"/>
+            <a:ext cx="4647480" cy="4205538"/>
+          </a:xfrm>
+        </p:spPr>
+        <p:txBody>
+          <a:bodyPr>
+            <a:normAutofit fontScale="92500" lnSpcReduction="20000"/>
+          </a:bodyPr>
+          <a:lstStyle/>
+          <a:p>
+            <a:r>
+              <a:rPr lang="en-US" sz="2000" dirty="0"/>
+              <a:t>0 – is still working</a:t>
+            </a:r>
+          </a:p>
+          <a:p>
+            <a:pPr marL="0" indent="0">
+              <a:buNone/>
+            </a:pPr>
+            <a:r>
+              <a:rPr lang="en-US" sz="2000" dirty="0"/>
+              <a:t>     1 – left</a:t>
+            </a:r>
+          </a:p>
+          <a:p>
+            <a:pPr marL="0" indent="0">
+              <a:buNone/>
+            </a:pPr>
+            <a:endParaRPr lang="en-US" sz="2000" dirty="0"/>
+          </a:p>
+          <a:p>
+            <a:r>
+              <a:rPr lang="en-GB" sz="2100" b="0" i="0" dirty="0">
+                <a:solidFill>
+                  <a:srgbClr val="292929"/>
+                </a:solidFill>
+                <a:effectLst/>
+              </a:rPr>
+              <a:t>Recall : from all the positive classes, how many we predicted correctly.</a:t>
+            </a:r>
+          </a:p>
+          <a:p>
+            <a:pPr marL="0" indent="0">
+              <a:buNone/>
+            </a:pPr>
+            <a:endParaRPr lang="en-US" dirty="0"/>
+          </a:p>
+          <a:p>
+            <a:r>
+              <a:rPr lang="en-GB" sz="2100" b="0" i="0" dirty="0">
+                <a:solidFill>
+                  <a:srgbClr val="292929"/>
+                </a:solidFill>
+                <a:effectLst/>
+              </a:rPr>
+              <a:t>Precision : from all the classes we have predicted as positive, how many are actually positive</a:t>
+            </a:r>
+            <a:endParaRPr lang="en-US" sz="2100" dirty="0"/>
+          </a:p>
+          <a:p>
+            <a:pPr marL="0" indent="0">
+              <a:buNone/>
+            </a:pPr>
+            <a:endParaRPr lang="en-US" dirty="0"/>
+          </a:p>
+          <a:p>
+            <a:pPr marL="0" indent="0">
+              <a:buNone/>
+            </a:pPr>
+            <a:endParaRPr lang="en-US" dirty="0"/>
+          </a:p>
+          <a:p>
+            <a:pPr marL="0" indent="0">
+              <a:buNone/>
+            </a:pPr>
+            <a:r>
+              <a:rPr lang="en-US" dirty="0"/>
+              <a:t> </a:t>
+            </a:r>
+          </a:p>
+        </p:txBody>
+      </p:sp>
+      <p:sp>
+        <p:nvSpPr>
+          <p:cNvPr id="3" name="Slide Number Placeholder 2">
+            <a:extLst>
+              <a:ext uri="{FF2B5EF4-FFF2-40B4-BE49-F238E27FC236}">
+                <a16:creationId xmlns:a16="http://schemas.microsoft.com/office/drawing/2014/main" id="{C02874A9-0305-49DA-9A22-D63D674A9263}"/>
+              </a:ext>
+            </a:extLst>
+          </p:cNvPr>
+          <p:cNvSpPr>
+            <a:spLocks noGrp="1"/>
+          </p:cNvSpPr>
+          <p:nvPr>
+            <p:ph type="sldNum" sz="quarter" idx="12"/>
+          </p:nvPr>
+        </p:nvSpPr>
+        <p:spPr/>
+        <p:txBody>
+          <a:bodyPr/>
+          <a:lstStyle/>
+          <a:p>
+            <a:fld id="{3A98EE3D-8CD1-4C3F-BD1C-C98C9596463C}" type="slidenum">
+              <a:rPr lang="en-US" smtClean="0"/>
+              <a:t>17</a:t>
+            </a:fld>
+            <a:endParaRPr lang="en-US" dirty="0"/>
+          </a:p>
+        </p:txBody>
+      </p:sp>
+      <p:graphicFrame>
+        <p:nvGraphicFramePr>
+          <p:cNvPr id="4" name="Table 4">
+            <a:extLst>
+              <a:ext uri="{FF2B5EF4-FFF2-40B4-BE49-F238E27FC236}">
+                <a16:creationId xmlns:a16="http://schemas.microsoft.com/office/drawing/2014/main" id="{2B207EB4-9C63-4A69-B101-8584519608DD}"/>
+              </a:ext>
+            </a:extLst>
+          </p:cNvPr>
+          <p:cNvGraphicFramePr>
+            <a:graphicFrameLocks noGrp="1"/>
+          </p:cNvGraphicFramePr>
+          <p:nvPr>
+            <p:extLst>
+              <p:ext uri="{D42A27DB-BD31-4B8C-83A1-F6EECF244321}">
+                <p14:modId xmlns:p14="http://schemas.microsoft.com/office/powerpoint/2010/main" val="3998012190"/>
+              </p:ext>
+            </p:extLst>
+          </p:nvPr>
+        </p:nvGraphicFramePr>
+        <p:xfrm>
+          <a:off x="357580" y="2404754"/>
+          <a:ext cx="5983844" cy="1601982"/>
+        </p:xfrm>
+        <a:graphic>
+          <a:graphicData uri="http://schemas.openxmlformats.org/drawingml/2006/table">
+            <a:tbl>
+              <a:tblPr firstRow="1" firstCol="1" bandRow="1">
+                <a:tableStyleId>{5C22544A-7EE6-4342-B048-85BDC9FD1C3A}</a:tableStyleId>
+              </a:tblPr>
+              <a:tblGrid>
+                <a:gridCol w="1517342">
+                  <a:extLst>
+                    <a:ext uri="{9D8B030D-6E8A-4147-A177-3AD203B41FA5}">
+                      <a16:colId xmlns:a16="http://schemas.microsoft.com/office/drawing/2014/main" val="2027860532"/>
+                    </a:ext>
+                  </a:extLst>
+                </a:gridCol>
+                <a:gridCol w="2210190">
+                  <a:extLst>
+                    <a:ext uri="{9D8B030D-6E8A-4147-A177-3AD203B41FA5}">
+                      <a16:colId xmlns:a16="http://schemas.microsoft.com/office/drawing/2014/main" val="2412986717"/>
+                    </a:ext>
+                  </a:extLst>
+                </a:gridCol>
+                <a:gridCol w="2256312">
+                  <a:extLst>
+                    <a:ext uri="{9D8B030D-6E8A-4147-A177-3AD203B41FA5}">
+                      <a16:colId xmlns:a16="http://schemas.microsoft.com/office/drawing/2014/main" val="2383014759"/>
+                    </a:ext>
+                  </a:extLst>
+                </a:gridCol>
+              </a:tblGrid>
+              <a:tr h="480951">
+                <a:tc>
+                  <a:txBody>
+                    <a:bodyPr/>
+                    <a:lstStyle/>
+                    <a:p>
+                      <a:pPr algn="ctr"/>
+                      <a:r>
+                        <a:rPr lang="en-GB" dirty="0"/>
+                        <a:t>4 Feature Approach</a:t>
+                      </a:r>
+                      <a:endParaRPr lang="en-AU" dirty="0"/>
+                    </a:p>
+                  </a:txBody>
+                  <a:tcPr/>
+                </a:tc>
+                <a:tc>
+                  <a:txBody>
+                    <a:bodyPr/>
+                    <a:lstStyle/>
+                    <a:p>
+                      <a:pPr algn="ctr"/>
+                      <a:r>
+                        <a:rPr lang="en-GB" dirty="0"/>
+                        <a:t>Precision </a:t>
+                      </a:r>
+                      <a:endParaRPr lang="en-AU" dirty="0"/>
+                    </a:p>
+                  </a:txBody>
+                  <a:tcPr/>
+                </a:tc>
+                <a:tc>
+                  <a:txBody>
+                    <a:bodyPr/>
+                    <a:lstStyle/>
+                    <a:p>
+                      <a:pPr algn="ctr"/>
+                      <a:r>
+                        <a:rPr lang="en-GB" dirty="0"/>
+                        <a:t>Recall</a:t>
+                      </a:r>
+                      <a:endParaRPr lang="en-AU" dirty="0"/>
+                    </a:p>
+                  </a:txBody>
+                  <a:tcPr/>
+                </a:tc>
+                <a:extLst>
+                  <a:ext uri="{0D108BD9-81ED-4DB2-BD59-A6C34878D82A}">
+                    <a16:rowId xmlns:a16="http://schemas.microsoft.com/office/drawing/2014/main" val="1247740611"/>
+                  </a:ext>
+                </a:extLst>
+              </a:tr>
+              <a:tr h="480951">
+                <a:tc>
+                  <a:txBody>
+                    <a:bodyPr/>
+                    <a:lstStyle/>
+                    <a:p>
+                      <a:pPr algn="ctr"/>
+                      <a:r>
+                        <a:rPr lang="en-GB" dirty="0"/>
+                        <a:t>Class 0</a:t>
+                      </a:r>
+                      <a:endParaRPr lang="en-AU" dirty="0"/>
+                    </a:p>
+                  </a:txBody>
+                  <a:tcPr/>
+                </a:tc>
+                <a:tc>
+                  <a:txBody>
+                    <a:bodyPr/>
+                    <a:lstStyle/>
+                    <a:p>
+                      <a:pPr algn="ctr"/>
+                      <a:r>
+                        <a:rPr lang="en-GB" dirty="0"/>
+                        <a:t>0.93</a:t>
+                      </a:r>
+                      <a:endParaRPr lang="en-AU" dirty="0"/>
+                    </a:p>
+                  </a:txBody>
+                  <a:tcPr/>
+                </a:tc>
+                <a:tc>
+                  <a:txBody>
+                    <a:bodyPr/>
+                    <a:lstStyle/>
+                    <a:p>
+                      <a:pPr algn="ctr"/>
+                      <a:r>
+                        <a:rPr lang="en-GB" dirty="0"/>
+                        <a:t>0.99</a:t>
+                      </a:r>
+                      <a:endParaRPr lang="en-AU" dirty="0"/>
+                    </a:p>
+                  </a:txBody>
+                  <a:tcPr/>
+                </a:tc>
+                <a:extLst>
+                  <a:ext uri="{0D108BD9-81ED-4DB2-BD59-A6C34878D82A}">
+                    <a16:rowId xmlns:a16="http://schemas.microsoft.com/office/drawing/2014/main" val="674328939"/>
+                  </a:ext>
+                </a:extLst>
+              </a:tr>
+              <a:tr h="480951">
+                <a:tc>
+                  <a:txBody>
+                    <a:bodyPr/>
+                    <a:lstStyle/>
+                    <a:p>
+                      <a:pPr algn="ctr"/>
+                      <a:r>
+                        <a:rPr lang="en-GB" dirty="0"/>
+                        <a:t>Class 1</a:t>
+                      </a:r>
+                      <a:endParaRPr lang="en-AU" dirty="0"/>
+                    </a:p>
+                  </a:txBody>
+                  <a:tcPr/>
+                </a:tc>
+                <a:tc>
+                  <a:txBody>
+                    <a:bodyPr/>
+                    <a:lstStyle/>
+                    <a:p>
+                      <a:pPr algn="ctr"/>
+                      <a:r>
+                        <a:rPr lang="en-GB" dirty="0"/>
+                        <a:t>0.98</a:t>
+                      </a:r>
+                      <a:endParaRPr lang="en-AU" dirty="0"/>
+                    </a:p>
+                  </a:txBody>
+                  <a:tcPr/>
+                </a:tc>
+                <a:tc>
+                  <a:txBody>
+                    <a:bodyPr/>
+                    <a:lstStyle/>
+                    <a:p>
+                      <a:pPr algn="ctr"/>
+                      <a:r>
+                        <a:rPr lang="en-GB" dirty="0"/>
+                        <a:t>0.93</a:t>
+                      </a:r>
+                      <a:endParaRPr lang="en-AU" dirty="0"/>
+                    </a:p>
+                  </a:txBody>
+                  <a:tcPr/>
+                </a:tc>
+                <a:extLst>
+                  <a:ext uri="{0D108BD9-81ED-4DB2-BD59-A6C34878D82A}">
+                    <a16:rowId xmlns:a16="http://schemas.microsoft.com/office/drawing/2014/main" val="2771351698"/>
+                  </a:ext>
+                </a:extLst>
+              </a:tr>
+            </a:tbl>
+          </a:graphicData>
+        </a:graphic>
+      </p:graphicFrame>
+      <p:graphicFrame>
+        <p:nvGraphicFramePr>
+          <p:cNvPr id="8" name="Table 4">
+            <a:extLst>
+              <a:ext uri="{FF2B5EF4-FFF2-40B4-BE49-F238E27FC236}">
+                <a16:creationId xmlns:a16="http://schemas.microsoft.com/office/drawing/2014/main" id="{AC20B3EF-6BB3-41E6-AD54-495ED5182FAB}"/>
+              </a:ext>
+            </a:extLst>
+          </p:cNvPr>
+          <p:cNvGraphicFramePr>
+            <a:graphicFrameLocks noGrp="1"/>
+          </p:cNvGraphicFramePr>
+          <p:nvPr>
+            <p:extLst>
+              <p:ext uri="{D42A27DB-BD31-4B8C-83A1-F6EECF244321}">
+                <p14:modId xmlns:p14="http://schemas.microsoft.com/office/powerpoint/2010/main" val="1222146495"/>
+              </p:ext>
+            </p:extLst>
+          </p:nvPr>
+        </p:nvGraphicFramePr>
+        <p:xfrm>
+          <a:off x="357580" y="4553862"/>
+          <a:ext cx="5983844" cy="1601982"/>
+        </p:xfrm>
+        <a:graphic>
+          <a:graphicData uri="http://schemas.openxmlformats.org/drawingml/2006/table">
+            <a:tbl>
+              <a:tblPr firstRow="1" firstCol="1" bandRow="1">
+                <a:tableStyleId>{5C22544A-7EE6-4342-B048-85BDC9FD1C3A}</a:tableStyleId>
+              </a:tblPr>
+              <a:tblGrid>
+                <a:gridCol w="1517342">
+                  <a:extLst>
+                    <a:ext uri="{9D8B030D-6E8A-4147-A177-3AD203B41FA5}">
+                      <a16:colId xmlns:a16="http://schemas.microsoft.com/office/drawing/2014/main" val="2027860532"/>
+                    </a:ext>
+                  </a:extLst>
+                </a:gridCol>
+                <a:gridCol w="2210190">
+                  <a:extLst>
+                    <a:ext uri="{9D8B030D-6E8A-4147-A177-3AD203B41FA5}">
+                      <a16:colId xmlns:a16="http://schemas.microsoft.com/office/drawing/2014/main" val="2412986717"/>
+                    </a:ext>
+                  </a:extLst>
+                </a:gridCol>
+                <a:gridCol w="2256312">
+                  <a:extLst>
+                    <a:ext uri="{9D8B030D-6E8A-4147-A177-3AD203B41FA5}">
+                      <a16:colId xmlns:a16="http://schemas.microsoft.com/office/drawing/2014/main" val="2383014759"/>
+                    </a:ext>
+                  </a:extLst>
+                </a:gridCol>
+              </a:tblGrid>
+              <a:tr h="480951">
+                <a:tc>
+                  <a:txBody>
+                    <a:bodyPr/>
+                    <a:lstStyle/>
+                    <a:p>
+                      <a:pPr algn="ctr"/>
+                      <a:r>
+                        <a:rPr lang="en-GB" dirty="0"/>
+                        <a:t>8 Feature Approach</a:t>
+                      </a:r>
+                      <a:endParaRPr lang="en-AU" dirty="0"/>
+                    </a:p>
+                  </a:txBody>
+                  <a:tcPr/>
+                </a:tc>
+                <a:tc>
+                  <a:txBody>
+                    <a:bodyPr/>
+                    <a:lstStyle/>
+                    <a:p>
+                      <a:pPr algn="ctr"/>
+                      <a:r>
+                        <a:rPr lang="en-GB" dirty="0"/>
+                        <a:t>Precision </a:t>
+                      </a:r>
+                      <a:endParaRPr lang="en-AU" dirty="0"/>
+                    </a:p>
+                  </a:txBody>
+                  <a:tcPr/>
+                </a:tc>
+                <a:tc>
+                  <a:txBody>
+                    <a:bodyPr/>
+                    <a:lstStyle/>
+                    <a:p>
+                      <a:pPr algn="ctr"/>
+                      <a:r>
+                        <a:rPr lang="en-GB" dirty="0"/>
+                        <a:t>Recall</a:t>
+                      </a:r>
+                      <a:endParaRPr lang="en-AU" dirty="0"/>
+                    </a:p>
+                  </a:txBody>
+                  <a:tcPr/>
+                </a:tc>
+                <a:extLst>
+                  <a:ext uri="{0D108BD9-81ED-4DB2-BD59-A6C34878D82A}">
+                    <a16:rowId xmlns:a16="http://schemas.microsoft.com/office/drawing/2014/main" val="1247740611"/>
+                  </a:ext>
+                </a:extLst>
+              </a:tr>
+              <a:tr h="480951">
+                <a:tc>
+                  <a:txBody>
+                    <a:bodyPr/>
+                    <a:lstStyle/>
+                    <a:p>
+                      <a:pPr algn="ctr"/>
+                      <a:r>
+                        <a:rPr lang="en-GB" dirty="0"/>
+                        <a:t>Class 0</a:t>
+                      </a:r>
+                      <a:endParaRPr lang="en-AU" dirty="0"/>
+                    </a:p>
+                  </a:txBody>
+                  <a:tcPr/>
+                </a:tc>
+                <a:tc>
+                  <a:txBody>
+                    <a:bodyPr/>
+                    <a:lstStyle/>
+                    <a:p>
+                      <a:pPr algn="ctr"/>
+                      <a:r>
+                        <a:rPr lang="en-GB" dirty="0"/>
+                        <a:t>0.93</a:t>
+                      </a:r>
+                      <a:endParaRPr lang="en-AU" dirty="0"/>
+                    </a:p>
+                  </a:txBody>
+                  <a:tcPr/>
+                </a:tc>
+                <a:tc>
+                  <a:txBody>
+                    <a:bodyPr/>
+                    <a:lstStyle/>
+                    <a:p>
+                      <a:pPr algn="ctr"/>
+                      <a:r>
+                        <a:rPr lang="en-GB" dirty="0"/>
+                        <a:t>0.98</a:t>
+                      </a:r>
+                      <a:endParaRPr lang="en-AU" dirty="0"/>
+                    </a:p>
+                  </a:txBody>
+                  <a:tcPr/>
+                </a:tc>
+                <a:extLst>
+                  <a:ext uri="{0D108BD9-81ED-4DB2-BD59-A6C34878D82A}">
+                    <a16:rowId xmlns:a16="http://schemas.microsoft.com/office/drawing/2014/main" val="674328939"/>
+                  </a:ext>
+                </a:extLst>
+              </a:tr>
+              <a:tr h="480951">
+                <a:tc>
+                  <a:txBody>
+                    <a:bodyPr/>
+                    <a:lstStyle/>
+                    <a:p>
+                      <a:pPr algn="ctr"/>
+                      <a:r>
+                        <a:rPr lang="en-GB" dirty="0"/>
+                        <a:t>Class 1</a:t>
+                      </a:r>
+                      <a:endParaRPr lang="en-AU" dirty="0"/>
+                    </a:p>
+                  </a:txBody>
+                  <a:tcPr/>
+                </a:tc>
+                <a:tc>
+                  <a:txBody>
+                    <a:bodyPr/>
+                    <a:lstStyle/>
+                    <a:p>
+                      <a:pPr algn="ctr"/>
+                      <a:r>
+                        <a:rPr lang="en-GB" dirty="0"/>
+                        <a:t>0.98</a:t>
+                      </a:r>
+                      <a:endParaRPr lang="en-AU" dirty="0"/>
+                    </a:p>
+                  </a:txBody>
+                  <a:tcPr/>
+                </a:tc>
+                <a:tc>
+                  <a:txBody>
+                    <a:bodyPr/>
+                    <a:lstStyle/>
+                    <a:p>
+                      <a:pPr algn="ctr"/>
+                      <a:r>
+                        <a:rPr lang="en-GB" dirty="0"/>
+                        <a:t>0.93</a:t>
+                      </a:r>
+                      <a:endParaRPr lang="en-AU" dirty="0"/>
+                    </a:p>
+                  </a:txBody>
+                  <a:tcPr/>
+                </a:tc>
+                <a:extLst>
+                  <a:ext uri="{0D108BD9-81ED-4DB2-BD59-A6C34878D82A}">
+                    <a16:rowId xmlns:a16="http://schemas.microsoft.com/office/drawing/2014/main" val="2771351698"/>
+                  </a:ext>
+                </a:extLst>
+              </a:tr>
+            </a:tbl>
+          </a:graphicData>
+        </a:graphic>
+      </p:graphicFrame>
+    </p:spTree>
+    <p:extLst>
+      <p:ext uri="{BB962C8B-B14F-4D97-AF65-F5344CB8AC3E}">
+        <p14:creationId xmlns:p14="http://schemas.microsoft.com/office/powerpoint/2010/main" val="352868250"/>
+      </p:ext>
+    </p:extLst>
+  </p:cSld>
+  <p:clrMapOvr>
+    <a:masterClrMapping/>
+  </p:clrMapOvr>
+</p:sld>
+</file>
+
+<file path=ppt/slides/slide18.xml><?xml version="1.0" encoding="utf-8"?>
+<p:sld xmlns:a="http://schemas.openxmlformats.org/drawingml/2006/main" xmlns:r="http://schemas.openxmlformats.org/officeDocument/2006/relationships" xmlns:p="http://schemas.openxmlformats.org/presentationml/2006/main">
+  <p:cSld>
+    <p:bg>
+      <p:bgPr>
+        <a:solidFill>
+          <a:schemeClr val="bg1"/>
+        </a:solidFill>
+        <a:effectLst/>
+      </p:bgPr>
+    </p:bg>
+    <p:spTree>
+      <p:nvGrpSpPr>
+        <p:cNvPr id="1" name=""/>
+        <p:cNvGrpSpPr/>
+        <p:nvPr/>
+      </p:nvGrpSpPr>
+      <p:grpSpPr>
+        <a:xfrm>
+          <a:off x="0" y="0"/>
+          <a:ext cx="0" cy="0"/>
+          <a:chOff x="0" y="0"/>
+          <a:chExt cx="0" cy="0"/>
+        </a:xfrm>
+      </p:grpSpPr>
+      <p:sp>
+        <p:nvSpPr>
+          <p:cNvPr id="2" name="Title 1">
+            <a:extLst>
+              <a:ext uri="{FF2B5EF4-FFF2-40B4-BE49-F238E27FC236}">
+                <a16:creationId xmlns:a16="http://schemas.microsoft.com/office/drawing/2014/main" id="{BA7E15D0-FAA3-42C9-8F19-D474198A997C}"/>
+              </a:ext>
+            </a:extLst>
+          </p:cNvPr>
+          <p:cNvSpPr>
+            <a:spLocks noGrp="1"/>
+          </p:cNvSpPr>
+          <p:nvPr>
+            <p:ph type="title"/>
+          </p:nvPr>
+        </p:nvSpPr>
+        <p:spPr>
+          <a:xfrm>
+            <a:off x="581192" y="702156"/>
+            <a:ext cx="11029616" cy="1188720"/>
+          </a:xfrm>
+        </p:spPr>
+        <p:txBody>
+          <a:bodyPr>
+            <a:noAutofit/>
+          </a:bodyPr>
+          <a:lstStyle/>
+          <a:p>
+            <a:r>
+              <a:rPr lang="en-AU" dirty="0"/>
+              <a:t>Model comparison &amp; Conclusion</a:t>
+            </a:r>
+            <a:br>
+              <a:rPr lang="en-AU" dirty="0"/>
+            </a:br>
+            <a:r>
+              <a:rPr lang="en-AU" sz="2400" dirty="0"/>
+              <a:t>Comparing 2 approaches</a:t>
+            </a:r>
+          </a:p>
+        </p:txBody>
+      </p:sp>
+      <p:sp>
+        <p:nvSpPr>
+          <p:cNvPr id="1036" name="Content Placeholder 1035">
+            <a:extLst>
+              <a:ext uri="{FF2B5EF4-FFF2-40B4-BE49-F238E27FC236}">
+                <a16:creationId xmlns:a16="http://schemas.microsoft.com/office/drawing/2014/main" id="{5245A8BD-60E1-46D9-93F6-6364C4E1C5E4}"/>
+              </a:ext>
+            </a:extLst>
+          </p:cNvPr>
+          <p:cNvSpPr>
+            <a:spLocks noGrp="1"/>
+          </p:cNvSpPr>
+          <p:nvPr>
+            <p:ph idx="1"/>
+          </p:nvPr>
+        </p:nvSpPr>
+        <p:spPr>
+          <a:xfrm>
             <a:off x="8624620" y="2112135"/>
             <a:ext cx="3379623" cy="3838609"/>
           </a:xfrm>
         </p:spPr>
         <p:txBody>
           <a:bodyPr>
-            <a:normAutofit fontScale="85000" lnSpcReduction="20000"/>
+            <a:normAutofit fontScale="47500" lnSpcReduction="20000"/>
           </a:bodyPr>
           <a:lstStyle/>
-          <a:p>
-            <a:r>
-              <a:rPr lang="en-US" sz="2000" dirty="0"/>
-              <a:t>0 – is still working</a:t>
-            </a:r>
-          </a:p>
-          <a:p>
-            <a:pPr marL="0" indent="0">
-              <a:buNone/>
-            </a:pPr>
-            <a:r>
-              <a:rPr lang="en-US" sz="2000" dirty="0"/>
-              <a:t>      1 – left</a:t>
-            </a:r>
-          </a:p>
-          <a:p>
-            <a:pPr marL="0" indent="0">
-              <a:buNone/>
-            </a:pPr>
-            <a:endParaRPr lang="en-US" sz="2000" dirty="0"/>
-          </a:p>
-          <a:p>
-            <a:r>
-              <a:rPr lang="en-US" sz="2000" dirty="0"/>
-              <a:t>8 feature approach with Random Forest model predicts slightly better on the class 1.</a:t>
-            </a:r>
-          </a:p>
           <a:p>
             <a:pPr marL="0" indent="0">
               <a:buNone/>
@@ -12112,12 +12762,40 @@
             <a:endParaRPr lang="en-US" dirty="0"/>
           </a:p>
           <a:p>
-            <a:endParaRPr lang="en-US" dirty="0"/>
-          </a:p>
-          <a:p>
-            <a:endParaRPr lang="en-US" dirty="0"/>
-          </a:p>
-          <a:p>
+            <a:r>
+              <a:rPr lang="en-US" sz="3400" dirty="0"/>
+              <a:t>0 – is still working</a:t>
+            </a:r>
+          </a:p>
+          <a:p>
+            <a:pPr marL="0" indent="0">
+              <a:buNone/>
+            </a:pPr>
+            <a:r>
+              <a:rPr lang="en-US" sz="3400" dirty="0"/>
+              <a:t>       1 – left</a:t>
+            </a:r>
+          </a:p>
+          <a:p>
+            <a:pPr marL="0" indent="0">
+              <a:buNone/>
+            </a:pPr>
+            <a:endParaRPr lang="en-US" sz="3400" dirty="0"/>
+          </a:p>
+          <a:p>
+            <a:r>
+              <a:rPr lang="en-US" sz="3400" dirty="0"/>
+              <a:t>8 feature approach with Random Forest model predicts slightly better on the class 1.</a:t>
+            </a:r>
+          </a:p>
+          <a:p>
+            <a:endParaRPr lang="en-US" sz="3400" dirty="0"/>
+          </a:p>
+          <a:p>
+            <a:r>
+              <a:rPr lang="en-US" sz="3400" dirty="0"/>
+              <a:t>Future predictions will be done by using Random Forest with 8 features.</a:t>
+            </a:r>
             <a:endParaRPr lang="en-US" dirty="0"/>
           </a:p>
           <a:p>
@@ -12248,7 +12926,7 @@
           <a:p>
             <a:fld id="{3A98EE3D-8CD1-4C3F-BD1C-C98C9596463C}" type="slidenum">
               <a:rPr lang="en-US" smtClean="0"/>
-              <a:t>17</a:t>
+              <a:t>18</a:t>
             </a:fld>
             <a:endParaRPr lang="en-US" dirty="0"/>
           </a:p>
@@ -12267,7 +12945,7 @@
 </p:sld>
 </file>
 
-<file path=ppt/slides/slide18.xml><?xml version="1.0" encoding="utf-8"?>
+<file path=ppt/slides/slide19.xml><?xml version="1.0" encoding="utf-8"?>
 <p:sld xmlns:a="http://schemas.openxmlformats.org/drawingml/2006/main" xmlns:r="http://schemas.openxmlformats.org/officeDocument/2006/relationships" xmlns:p="http://schemas.openxmlformats.org/presentationml/2006/main">
   <p:cSld>
     <p:bg>
@@ -12478,7 +13156,7 @@
           <a:p>
             <a:fld id="{3A98EE3D-8CD1-4C3F-BD1C-C98C9596463C}" type="slidenum">
               <a:rPr lang="en-US" smtClean="0"/>
-              <a:t>18</a:t>
+              <a:t>19</a:t>
             </a:fld>
             <a:endParaRPr lang="en-US" dirty="0"/>
           </a:p>
@@ -12488,113 +13166,6 @@
     <p:extLst>
       <p:ext uri="{BB962C8B-B14F-4D97-AF65-F5344CB8AC3E}">
         <p14:creationId xmlns:p14="http://schemas.microsoft.com/office/powerpoint/2010/main" val="2701289500"/>
-      </p:ext>
-    </p:extLst>
-  </p:cSld>
-  <p:clrMapOvr>
-    <a:masterClrMapping/>
-  </p:clrMapOvr>
-</p:sld>
-</file>
-
-<file path=ppt/slides/slide19.xml><?xml version="1.0" encoding="utf-8"?>
-<p:sld xmlns:a="http://schemas.openxmlformats.org/drawingml/2006/main" xmlns:r="http://schemas.openxmlformats.org/officeDocument/2006/relationships" xmlns:p="http://schemas.openxmlformats.org/presentationml/2006/main">
-  <p:cSld>
-    <p:spTree>
-      <p:nvGrpSpPr>
-        <p:cNvPr id="1" name=""/>
-        <p:cNvGrpSpPr/>
-        <p:nvPr/>
-      </p:nvGrpSpPr>
-      <p:grpSpPr>
-        <a:xfrm>
-          <a:off x="0" y="0"/>
-          <a:ext cx="0" cy="0"/>
-          <a:chOff x="0" y="0"/>
-          <a:chExt cx="0" cy="0"/>
-        </a:xfrm>
-      </p:grpSpPr>
-      <p:sp>
-        <p:nvSpPr>
-          <p:cNvPr id="2" name="Slide Number Placeholder 1">
-            <a:extLst>
-              <a:ext uri="{FF2B5EF4-FFF2-40B4-BE49-F238E27FC236}">
-                <a16:creationId xmlns:a16="http://schemas.microsoft.com/office/drawing/2014/main" id="{3B403F81-0DD5-4392-BA8D-03520D06B360}"/>
-              </a:ext>
-            </a:extLst>
-          </p:cNvPr>
-          <p:cNvSpPr>
-            <a:spLocks noGrp="1"/>
-          </p:cNvSpPr>
-          <p:nvPr>
-            <p:ph type="sldNum" sz="quarter" idx="12"/>
-          </p:nvPr>
-        </p:nvSpPr>
-        <p:spPr/>
-        <p:txBody>
-          <a:bodyPr/>
-          <a:lstStyle/>
-          <a:p>
-            <a:fld id="{3A98EE3D-8CD1-4C3F-BD1C-C98C9596463C}" type="slidenum">
-              <a:rPr lang="en-US" smtClean="0"/>
-              <a:t>19</a:t>
-            </a:fld>
-            <a:endParaRPr lang="en-US" dirty="0"/>
-          </a:p>
-        </p:txBody>
-      </p:sp>
-      <p:sp>
-        <p:nvSpPr>
-          <p:cNvPr id="3" name="TextBox 2">
-            <a:extLst>
-              <a:ext uri="{FF2B5EF4-FFF2-40B4-BE49-F238E27FC236}">
-                <a16:creationId xmlns:a16="http://schemas.microsoft.com/office/drawing/2014/main" id="{2BDCC1D3-1219-4B42-9EF3-E0ED4798C83A}"/>
-              </a:ext>
-            </a:extLst>
-          </p:cNvPr>
-          <p:cNvSpPr txBox="1"/>
-          <p:nvPr/>
-        </p:nvSpPr>
-        <p:spPr>
-          <a:xfrm>
-            <a:off x="1128156" y="2398816"/>
-            <a:ext cx="9054935" cy="2123658"/>
-          </a:xfrm>
-          <a:prstGeom prst="rect">
-            <a:avLst/>
-          </a:prstGeom>
-          <a:noFill/>
-        </p:spPr>
-        <p:txBody>
-          <a:bodyPr wrap="square" rtlCol="0">
-            <a:spAutoFit/>
-          </a:bodyPr>
-          <a:lstStyle/>
-          <a:p>
-            <a:pPr algn="ctr"/>
-            <a:r>
-              <a:rPr lang="en-GB" sz="4400" dirty="0"/>
-              <a:t>THANK YOU !</a:t>
-            </a:r>
-          </a:p>
-          <a:p>
-            <a:pPr algn="ctr"/>
-            <a:endParaRPr lang="en-GB" sz="4400" dirty="0"/>
-          </a:p>
-          <a:p>
-            <a:pPr algn="ctr"/>
-            <a:r>
-              <a:rPr lang="en-AU" sz="4400" dirty="0"/>
-              <a:t>ANY QUESTIONS ?</a:t>
-            </a:r>
-            <a:endParaRPr lang="en-GB" sz="4400" dirty="0"/>
-          </a:p>
-        </p:txBody>
-      </p:sp>
-    </p:spTree>
-    <p:extLst>
-      <p:ext uri="{BB962C8B-B14F-4D97-AF65-F5344CB8AC3E}">
-        <p14:creationId xmlns:p14="http://schemas.microsoft.com/office/powerpoint/2010/main" val="2147839770"/>
       </p:ext>
     </p:extLst>
   </p:cSld>
@@ -13019,7 +13590,7 @@
             <a:pPr algn="ctr"/>
             <a:r>
               <a:rPr lang="en-GB" dirty="0"/>
-              <a:t>Comparison</a:t>
+              <a:t>Comparison &amp; Conclusion</a:t>
             </a:r>
             <a:endParaRPr lang="en-AU" dirty="0"/>
           </a:p>
@@ -13308,6 +13879,113 @@
     <p:extLst>
       <p:ext uri="{BB962C8B-B14F-4D97-AF65-F5344CB8AC3E}">
         <p14:creationId xmlns:p14="http://schemas.microsoft.com/office/powerpoint/2010/main" val="263784652"/>
+      </p:ext>
+    </p:extLst>
+  </p:cSld>
+  <p:clrMapOvr>
+    <a:masterClrMapping/>
+  </p:clrMapOvr>
+</p:sld>
+</file>
+
+<file path=ppt/slides/slide20.xml><?xml version="1.0" encoding="utf-8"?>
+<p:sld xmlns:a="http://schemas.openxmlformats.org/drawingml/2006/main" xmlns:r="http://schemas.openxmlformats.org/officeDocument/2006/relationships" xmlns:p="http://schemas.openxmlformats.org/presentationml/2006/main">
+  <p:cSld>
+    <p:spTree>
+      <p:nvGrpSpPr>
+        <p:cNvPr id="1" name=""/>
+        <p:cNvGrpSpPr/>
+        <p:nvPr/>
+      </p:nvGrpSpPr>
+      <p:grpSpPr>
+        <a:xfrm>
+          <a:off x="0" y="0"/>
+          <a:ext cx="0" cy="0"/>
+          <a:chOff x="0" y="0"/>
+          <a:chExt cx="0" cy="0"/>
+        </a:xfrm>
+      </p:grpSpPr>
+      <p:sp>
+        <p:nvSpPr>
+          <p:cNvPr id="2" name="Slide Number Placeholder 1">
+            <a:extLst>
+              <a:ext uri="{FF2B5EF4-FFF2-40B4-BE49-F238E27FC236}">
+                <a16:creationId xmlns:a16="http://schemas.microsoft.com/office/drawing/2014/main" id="{3B403F81-0DD5-4392-BA8D-03520D06B360}"/>
+              </a:ext>
+            </a:extLst>
+          </p:cNvPr>
+          <p:cNvSpPr>
+            <a:spLocks noGrp="1"/>
+          </p:cNvSpPr>
+          <p:nvPr>
+            <p:ph type="sldNum" sz="quarter" idx="12"/>
+          </p:nvPr>
+        </p:nvSpPr>
+        <p:spPr/>
+        <p:txBody>
+          <a:bodyPr/>
+          <a:lstStyle/>
+          <a:p>
+            <a:fld id="{3A98EE3D-8CD1-4C3F-BD1C-C98C9596463C}" type="slidenum">
+              <a:rPr lang="en-US" smtClean="0"/>
+              <a:t>20</a:t>
+            </a:fld>
+            <a:endParaRPr lang="en-US" dirty="0"/>
+          </a:p>
+        </p:txBody>
+      </p:sp>
+      <p:sp>
+        <p:nvSpPr>
+          <p:cNvPr id="3" name="TextBox 2">
+            <a:extLst>
+              <a:ext uri="{FF2B5EF4-FFF2-40B4-BE49-F238E27FC236}">
+                <a16:creationId xmlns:a16="http://schemas.microsoft.com/office/drawing/2014/main" id="{2BDCC1D3-1219-4B42-9EF3-E0ED4798C83A}"/>
+              </a:ext>
+            </a:extLst>
+          </p:cNvPr>
+          <p:cNvSpPr txBox="1"/>
+          <p:nvPr/>
+        </p:nvSpPr>
+        <p:spPr>
+          <a:xfrm>
+            <a:off x="1128156" y="2398816"/>
+            <a:ext cx="9054935" cy="2123658"/>
+          </a:xfrm>
+          <a:prstGeom prst="rect">
+            <a:avLst/>
+          </a:prstGeom>
+          <a:noFill/>
+        </p:spPr>
+        <p:txBody>
+          <a:bodyPr wrap="square" rtlCol="0">
+            <a:spAutoFit/>
+          </a:bodyPr>
+          <a:lstStyle/>
+          <a:p>
+            <a:pPr algn="ctr"/>
+            <a:r>
+              <a:rPr lang="en-GB" sz="4400" dirty="0"/>
+              <a:t>THANK YOU !</a:t>
+            </a:r>
+          </a:p>
+          <a:p>
+            <a:pPr algn="ctr"/>
+            <a:endParaRPr lang="en-GB" sz="4400" dirty="0"/>
+          </a:p>
+          <a:p>
+            <a:pPr algn="ctr"/>
+            <a:r>
+              <a:rPr lang="en-AU" sz="4400" dirty="0"/>
+              <a:t>ANY QUESTIONS ?</a:t>
+            </a:r>
+            <a:endParaRPr lang="en-GB" sz="4400" dirty="0"/>
+          </a:p>
+        </p:txBody>
+      </p:sp>
+    </p:spTree>
+    <p:extLst>
+      <p:ext uri="{BB962C8B-B14F-4D97-AF65-F5344CB8AC3E}">
+        <p14:creationId xmlns:p14="http://schemas.microsoft.com/office/powerpoint/2010/main" val="2147839770"/>
       </p:ext>
     </p:extLst>
   </p:cSld>
@@ -16226,6 +16904,15 @@
 </file>
 
 <file path=customXml/item1.xml><?xml version="1.0" encoding="utf-8"?>
+<?mso-contentType ?>
+<FormTemplates xmlns="http://schemas.microsoft.com/sharepoint/v3/contenttype/forms">
+  <Display>DocumentLibraryForm</Display>
+  <Edit>DocumentLibraryForm</Edit>
+  <New>DocumentLibraryForm</New>
+</FormTemplates>
+</file>
+
+<file path=customXml/item2.xml><?xml version="1.0" encoding="utf-8"?>
 <ct:contentTypeSchema xmlns:ct="http://schemas.microsoft.com/office/2006/metadata/contentType" xmlns:ma="http://schemas.microsoft.com/office/2006/metadata/properties/metaAttributes" ct:_="" ma:_="" ma:contentTypeName="Document" ma:contentTypeID="0x01010079F111ED35F8CC479449609E8A0923A6" ma:contentTypeVersion="12" ma:contentTypeDescription="Create a new document." ma:contentTypeScope="" ma:versionID="a410dd7f93c95333ffa1b60ed6adedd1">
   <xsd:schema xmlns:xsd="http://www.w3.org/2001/XMLSchema" xmlns:xs="http://www.w3.org/2001/XMLSchema" xmlns:p="http://schemas.microsoft.com/office/2006/metadata/properties" xmlns:ns2="71af3243-3dd4-4a8d-8c0d-dd76da1f02a5" xmlns:ns3="16c05727-aa75-4e4a-9b5f-8a80a1165891" targetNamespace="http://schemas.microsoft.com/office/2006/metadata/properties" ma:root="true" ma:fieldsID="a936d9baba76aa3866493feff160faab" ns2:_="" ns3:_="">
     <xsd:import namespace="71af3243-3dd4-4a8d-8c0d-dd76da1f02a5"/>
@@ -16446,15 +17133,6 @@
 </ct:contentTypeSchema>
 </file>
 
-<file path=customXml/item2.xml><?xml version="1.0" encoding="utf-8"?>
-<?mso-contentType ?>
-<FormTemplates xmlns="http://schemas.microsoft.com/sharepoint/v3/contenttype/forms">
-  <Display>DocumentLibraryForm</Display>
-  <Edit>DocumentLibraryForm</Edit>
-  <New>DocumentLibraryForm</New>
-</FormTemplates>
-</file>
-
 <file path=customXml/item3.xml><?xml version="1.0" encoding="utf-8"?>
 <p:properties xmlns:p="http://schemas.microsoft.com/office/2006/metadata/properties" xmlns:xsi="http://www.w3.org/2001/XMLSchema-instance" xmlns:pc="http://schemas.microsoft.com/office/infopath/2007/PartnerControls">
   <documentManagement>
@@ -16465,6 +17143,14 @@
 </file>
 
 <file path=customXml/itemProps1.xml><?xml version="1.0" encoding="utf-8"?>
+<ds:datastoreItem xmlns:ds="http://schemas.openxmlformats.org/officeDocument/2006/customXml" ds:itemID="{927BD4C1-B6B1-4715-ABF9-E660A51A4EA0}">
+  <ds:schemaRefs>
+    <ds:schemaRef ds:uri="http://schemas.microsoft.com/sharepoint/v3/contenttype/forms"/>
+  </ds:schemaRefs>
+</ds:datastoreItem>
+</file>
+
+<file path=customXml/itemProps2.xml><?xml version="1.0" encoding="utf-8"?>
 <ds:datastoreItem xmlns:ds="http://schemas.openxmlformats.org/officeDocument/2006/customXml" ds:itemID="{41E7CA09-9778-4414-AE97-8064B12DA30E}">
   <ds:schemaRefs>
     <ds:schemaRef ds:uri="http://schemas.microsoft.com/office/2006/metadata/contentType"/>
@@ -16483,14 +17169,6 @@
 </ds:datastoreItem>
 </file>
 
-<file path=customXml/itemProps2.xml><?xml version="1.0" encoding="utf-8"?>
-<ds:datastoreItem xmlns:ds="http://schemas.openxmlformats.org/officeDocument/2006/customXml" ds:itemID="{927BD4C1-B6B1-4715-ABF9-E660A51A4EA0}">
-  <ds:schemaRefs>
-    <ds:schemaRef ds:uri="http://schemas.microsoft.com/sharepoint/v3/contenttype/forms"/>
-  </ds:schemaRefs>
-</ds:datastoreItem>
-</file>
-
 <file path=customXml/itemProps3.xml><?xml version="1.0" encoding="utf-8"?>
 <ds:datastoreItem xmlns:ds="http://schemas.openxmlformats.org/officeDocument/2006/customXml" ds:itemID="{8D289AE2-D2AE-49D1-AFAC-3A79F6794255}">
   <ds:schemaRefs>

</xml_diff>